<commit_message>
Removed use of text
</commit_message>
<xml_diff>
--- a/Raspberry Pi Tutorials.pptx
+++ b/Raspberry Pi Tutorials.pptx
@@ -5,12 +5,16 @@
     <p:sldMasterId id="2147483660" r:id="rId1"/>
   </p:sldMasterIdLst>
   <p:notesMasterIdLst>
-    <p:notesMasterId r:id="rId5"/>
+    <p:notesMasterId r:id="rId9"/>
   </p:notesMasterIdLst>
   <p:sldIdLst>
     <p:sldId id="256" r:id="rId2"/>
     <p:sldId id="257" r:id="rId3"/>
     <p:sldId id="258" r:id="rId4"/>
+    <p:sldId id="259" r:id="rId5"/>
+    <p:sldId id="260" r:id="rId6"/>
+    <p:sldId id="261" r:id="rId7"/>
+    <p:sldId id="262" r:id="rId8"/>
   </p:sldIdLst>
   <p:sldSz cx="12192000" cy="6858000"/>
   <p:notesSz cx="6858000" cy="9144000"/>
@@ -109,6 +113,11 @@
       </a:defRPr>
     </a:lvl9pPr>
   </p:defaultTextStyle>
+  <p:extLst>
+    <p:ext uri="{EFAFB233-063F-42B5-8137-9DF3F51BA10A}">
+      <p15:sldGuideLst xmlns:p15="http://schemas.microsoft.com/office/powerpoint/2012/main"/>
+    </p:ext>
+  </p:extLst>
 </p:presentation>
 </file>
 
@@ -660,6 +669,13 @@
             <a:schemeClr val="lt1"/>
           </a:fontRef>
         </p:style>
+        <p:txBody>
+          <a:bodyPr/>
+          <a:lstStyle/>
+          <a:p>
+            <a:endParaRPr lang="da-DK"/>
+          </a:p>
+        </p:txBody>
       </p:sp>
       <p:sp>
         <p:nvSpPr>
@@ -733,6 +749,13 @@
             <a:schemeClr val="lt1"/>
           </a:fontRef>
         </p:style>
+        <p:txBody>
+          <a:bodyPr/>
+          <a:lstStyle/>
+          <a:p>
+            <a:endParaRPr lang="da-DK"/>
+          </a:p>
+        </p:txBody>
       </p:sp>
       <p:sp>
         <p:nvSpPr>
@@ -803,6 +826,13 @@
             <a:schemeClr val="lt1"/>
           </a:fontRef>
         </p:style>
+        <p:txBody>
+          <a:bodyPr/>
+          <a:lstStyle/>
+          <a:p>
+            <a:endParaRPr lang="da-DK"/>
+          </a:p>
+        </p:txBody>
       </p:sp>
       <p:sp>
         <p:nvSpPr>
@@ -861,6 +891,13 @@
             <a:schemeClr val="tx1"/>
           </a:fontRef>
         </p:style>
+        <p:txBody>
+          <a:bodyPr/>
+          <a:lstStyle/>
+          <a:p>
+            <a:endParaRPr lang="da-DK"/>
+          </a:p>
+        </p:txBody>
       </p:sp>
       <p:sp>
         <p:nvSpPr>
@@ -1115,6 +1152,13 @@
             <a:schemeClr val="lt1"/>
           </a:fontRef>
         </p:style>
+        <p:txBody>
+          <a:bodyPr/>
+          <a:lstStyle/>
+          <a:p>
+            <a:endParaRPr lang="da-DK"/>
+          </a:p>
+        </p:txBody>
       </p:sp>
     </p:spTree>
     <p:extLst>
@@ -6076,6 +6120,13 @@
               <a:schemeClr val="lt1"/>
             </a:fontRef>
           </p:style>
+          <p:txBody>
+            <a:bodyPr/>
+            <a:lstStyle/>
+            <a:p>
+              <a:endParaRPr lang="da-DK"/>
+            </a:p>
+          </p:txBody>
         </p:sp>
         <p:sp>
           <p:nvSpPr>
@@ -6132,6 +6183,13 @@
               <a:schemeClr val="tx1"/>
             </a:fontRef>
           </p:style>
+          <p:txBody>
+            <a:bodyPr/>
+            <a:lstStyle/>
+            <a:p>
+              <a:endParaRPr lang="da-DK"/>
+            </a:p>
+          </p:txBody>
         </p:sp>
         <p:sp>
           <p:nvSpPr>
@@ -6181,6 +6239,13 @@
               <a:schemeClr val="lt1"/>
             </a:fontRef>
           </p:style>
+          <p:txBody>
+            <a:bodyPr/>
+            <a:lstStyle/>
+            <a:p>
+              <a:endParaRPr lang="da-DK"/>
+            </a:p>
+          </p:txBody>
         </p:sp>
       </p:grpSp>
       <p:sp>
@@ -7042,19 +7107,535 @@
           <a:lstStyle/>
           <a:p>
             <a:r>
-              <a:rPr lang="da-DK"/>
+              <a:rPr lang="da-DK" dirty="0"/>
               <a:t>Model-View-Viewmodel</a:t>
             </a:r>
           </a:p>
           <a:p>
-            <a:endParaRPr lang="da-DK"/>
-          </a:p>
-        </p:txBody>
-      </p:sp>
+            <a:pPr lvl="1"/>
+            <a:r>
+              <a:rPr lang="da-DK" dirty="0" err="1"/>
+              <a:t>Frontend</a:t>
+            </a:r>
+            <a:endParaRPr lang="da-DK" dirty="0"/>
+          </a:p>
+          <a:p>
+            <a:pPr lvl="1"/>
+            <a:r>
+              <a:rPr lang="da-DK" dirty="0" err="1"/>
+              <a:t>Backend</a:t>
+            </a:r>
+            <a:endParaRPr lang="da-DK" dirty="0"/>
+          </a:p>
+          <a:p>
+            <a:pPr lvl="1"/>
+            <a:r>
+              <a:rPr lang="da-DK" dirty="0"/>
+              <a:t>Database</a:t>
+            </a:r>
+          </a:p>
+          <a:p>
+            <a:pPr lvl="1"/>
+            <a:endParaRPr lang="da-DK" dirty="0"/>
+          </a:p>
+          <a:p>
+            <a:endParaRPr lang="da-DK" dirty="0"/>
+          </a:p>
+        </p:txBody>
+      </p:sp>
+      <p:pic>
+        <p:nvPicPr>
+          <p:cNvPr id="5" name="Billede 4" descr="Et billede, der indeholder tekst, linje/række, skærmbillede, diagram&#10;&#10;AI-genereret indhold kan være ukorrekt.">
+            <a:extLst>
+              <a:ext uri="{FF2B5EF4-FFF2-40B4-BE49-F238E27FC236}">
+                <a16:creationId xmlns:a16="http://schemas.microsoft.com/office/drawing/2014/main" id="{84C27230-7B6B-46E0-79F9-00EC25FE1FEE}"/>
+              </a:ext>
+            </a:extLst>
+          </p:cNvPr>
+          <p:cNvPicPr>
+            <a:picLocks noChangeAspect="1"/>
+          </p:cNvPicPr>
+          <p:nvPr/>
+        </p:nvPicPr>
+        <p:blipFill>
+          <a:blip r:embed="rId2">
+            <a:extLst>
+              <a:ext uri="{28A0092B-C50C-407E-A947-70E740481C1C}">
+                <a14:useLocalDpi xmlns:a14="http://schemas.microsoft.com/office/drawing/2010/main" val="0"/>
+              </a:ext>
+            </a:extLst>
+          </a:blip>
+          <a:stretch>
+            <a:fillRect/>
+          </a:stretch>
+        </p:blipFill>
+        <p:spPr>
+          <a:xfrm>
+            <a:off x="9547452" y="1995487"/>
+            <a:ext cx="1152525" cy="2867025"/>
+          </a:xfrm>
+          <a:prstGeom prst="rect">
+            <a:avLst/>
+          </a:prstGeom>
+        </p:spPr>
+      </p:pic>
     </p:spTree>
     <p:extLst>
       <p:ext uri="{BB962C8B-B14F-4D97-AF65-F5344CB8AC3E}">
         <p14:creationId xmlns:p14="http://schemas.microsoft.com/office/powerpoint/2010/main" val="2254559439"/>
+      </p:ext>
+    </p:extLst>
+  </p:cSld>
+  <p:clrMapOvr>
+    <a:masterClrMapping/>
+  </p:clrMapOvr>
+</p:sld>
+</file>
+
+<file path=ppt/slides/slide4.xml><?xml version="1.0" encoding="utf-8"?>
+<p:sld xmlns:a="http://schemas.openxmlformats.org/drawingml/2006/main" xmlns:r="http://schemas.openxmlformats.org/officeDocument/2006/relationships" xmlns:p="http://schemas.openxmlformats.org/presentationml/2006/main">
+  <p:cSld>
+    <p:spTree>
+      <p:nvGrpSpPr>
+        <p:cNvPr id="1" name=""/>
+        <p:cNvGrpSpPr/>
+        <p:nvPr/>
+      </p:nvGrpSpPr>
+      <p:grpSpPr>
+        <a:xfrm>
+          <a:off x="0" y="0"/>
+          <a:ext cx="0" cy="0"/>
+          <a:chOff x="0" y="0"/>
+          <a:chExt cx="0" cy="0"/>
+        </a:xfrm>
+      </p:grpSpPr>
+      <p:sp>
+        <p:nvSpPr>
+          <p:cNvPr id="2" name="Titel 1">
+            <a:extLst>
+              <a:ext uri="{FF2B5EF4-FFF2-40B4-BE49-F238E27FC236}">
+                <a16:creationId xmlns:a16="http://schemas.microsoft.com/office/drawing/2014/main" id="{61E4C19A-B8AD-048E-A405-9E5AAC1D3609}"/>
+              </a:ext>
+            </a:extLst>
+          </p:cNvPr>
+          <p:cNvSpPr>
+            <a:spLocks noGrp="1"/>
+          </p:cNvSpPr>
+          <p:nvPr>
+            <p:ph type="title"/>
+          </p:nvPr>
+        </p:nvSpPr>
+        <p:spPr/>
+        <p:txBody>
+          <a:bodyPr/>
+          <a:lstStyle/>
+          <a:p>
+            <a:r>
+              <a:rPr lang="da-DK" dirty="0"/>
+              <a:t>Systemdesign</a:t>
+            </a:r>
+          </a:p>
+        </p:txBody>
+      </p:sp>
+      <p:sp>
+        <p:nvSpPr>
+          <p:cNvPr id="3" name="Pladsholder til indhold 2">
+            <a:extLst>
+              <a:ext uri="{FF2B5EF4-FFF2-40B4-BE49-F238E27FC236}">
+                <a16:creationId xmlns:a16="http://schemas.microsoft.com/office/drawing/2014/main" id="{27243E2F-01EF-BE53-1DC9-C6135E97B559}"/>
+              </a:ext>
+            </a:extLst>
+          </p:cNvPr>
+          <p:cNvSpPr>
+            <a:spLocks noGrp="1"/>
+          </p:cNvSpPr>
+          <p:nvPr>
+            <p:ph idx="1"/>
+          </p:nvPr>
+        </p:nvSpPr>
+        <p:spPr>
+          <a:xfrm>
+            <a:off x="685800" y="2063396"/>
+            <a:ext cx="4060371" cy="3311189"/>
+          </a:xfrm>
+        </p:spPr>
+        <p:txBody>
+          <a:bodyPr/>
+          <a:lstStyle/>
+          <a:p>
+            <a:r>
+              <a:rPr lang="da-DK" dirty="0" err="1"/>
+              <a:t>Frontend</a:t>
+            </a:r>
+            <a:endParaRPr lang="da-DK" dirty="0"/>
+          </a:p>
+          <a:p>
+            <a:pPr lvl="1"/>
+            <a:r>
+              <a:rPr lang="da-DK" dirty="0"/>
+              <a:t>API </a:t>
+            </a:r>
+            <a:r>
+              <a:rPr lang="da-DK" dirty="0" err="1"/>
+              <a:t>endpoints</a:t>
+            </a:r>
+            <a:r>
+              <a:rPr lang="da-DK" dirty="0"/>
+              <a:t> </a:t>
+            </a:r>
+            <a:r>
+              <a:rPr lang="da-DK" dirty="0" err="1"/>
+              <a:t>connected</a:t>
+            </a:r>
+            <a:r>
+              <a:rPr lang="da-DK" dirty="0"/>
+              <a:t> to </a:t>
+            </a:r>
+            <a:r>
+              <a:rPr lang="da-DK" dirty="0" err="1"/>
+              <a:t>frontend</a:t>
+            </a:r>
+            <a:endParaRPr lang="da-DK" dirty="0"/>
+          </a:p>
+          <a:p>
+            <a:pPr lvl="1"/>
+            <a:r>
+              <a:rPr lang="da-DK" dirty="0"/>
+              <a:t>Database manager handles database </a:t>
+            </a:r>
+            <a:r>
+              <a:rPr lang="da-DK" dirty="0" err="1"/>
+              <a:t>connection</a:t>
+            </a:r>
+            <a:endParaRPr lang="da-DK" dirty="0"/>
+          </a:p>
+          <a:p>
+            <a:endParaRPr lang="da-DK" dirty="0"/>
+          </a:p>
+          <a:p>
+            <a:endParaRPr lang="da-DK" dirty="0"/>
+          </a:p>
+        </p:txBody>
+      </p:sp>
+      <p:pic>
+        <p:nvPicPr>
+          <p:cNvPr id="9" name="Billede 8" descr="Et billede, der indeholder tekst, diagram, skærmbillede, Rektangel&#10;&#10;AI-genereret indhold kan være ukorrekt.">
+            <a:extLst>
+              <a:ext uri="{FF2B5EF4-FFF2-40B4-BE49-F238E27FC236}">
+                <a16:creationId xmlns:a16="http://schemas.microsoft.com/office/drawing/2014/main" id="{71C875FE-C358-CF69-B5A5-795C03CBB29C}"/>
+              </a:ext>
+            </a:extLst>
+          </p:cNvPr>
+          <p:cNvPicPr>
+            <a:picLocks noChangeAspect="1"/>
+          </p:cNvPicPr>
+          <p:nvPr/>
+        </p:nvPicPr>
+        <p:blipFill>
+          <a:blip r:embed="rId2">
+            <a:extLst>
+              <a:ext uri="{28A0092B-C50C-407E-A947-70E740481C1C}">
+                <a14:useLocalDpi xmlns:a14="http://schemas.microsoft.com/office/drawing/2010/main" val="0"/>
+              </a:ext>
+            </a:extLst>
+          </a:blip>
+          <a:stretch>
+            <a:fillRect/>
+          </a:stretch>
+        </p:blipFill>
+        <p:spPr>
+          <a:xfrm>
+            <a:off x="4829174" y="1483415"/>
+            <a:ext cx="6677025" cy="4724400"/>
+          </a:xfrm>
+          <a:prstGeom prst="rect">
+            <a:avLst/>
+          </a:prstGeom>
+        </p:spPr>
+      </p:pic>
+    </p:spTree>
+    <p:extLst>
+      <p:ext uri="{BB962C8B-B14F-4D97-AF65-F5344CB8AC3E}">
+        <p14:creationId xmlns:p14="http://schemas.microsoft.com/office/powerpoint/2010/main" val="600394473"/>
+      </p:ext>
+    </p:extLst>
+  </p:cSld>
+  <p:clrMapOvr>
+    <a:masterClrMapping/>
+  </p:clrMapOvr>
+</p:sld>
+</file>
+
+<file path=ppt/slides/slide5.xml><?xml version="1.0" encoding="utf-8"?>
+<p:sld xmlns:a="http://schemas.openxmlformats.org/drawingml/2006/main" xmlns:r="http://schemas.openxmlformats.org/officeDocument/2006/relationships" xmlns:p="http://schemas.openxmlformats.org/presentationml/2006/main">
+  <p:cSld>
+    <p:spTree>
+      <p:nvGrpSpPr>
+        <p:cNvPr id="1" name=""/>
+        <p:cNvGrpSpPr/>
+        <p:nvPr/>
+      </p:nvGrpSpPr>
+      <p:grpSpPr>
+        <a:xfrm>
+          <a:off x="0" y="0"/>
+          <a:ext cx="0" cy="0"/>
+          <a:chOff x="0" y="0"/>
+          <a:chExt cx="0" cy="0"/>
+        </a:xfrm>
+      </p:grpSpPr>
+      <p:sp>
+        <p:nvSpPr>
+          <p:cNvPr id="2" name="Titel 1">
+            <a:extLst>
+              <a:ext uri="{FF2B5EF4-FFF2-40B4-BE49-F238E27FC236}">
+                <a16:creationId xmlns:a16="http://schemas.microsoft.com/office/drawing/2014/main" id="{022D58C3-2F7C-AD8A-D6E0-37C5DBAF5BA1}"/>
+              </a:ext>
+            </a:extLst>
+          </p:cNvPr>
+          <p:cNvSpPr>
+            <a:spLocks noGrp="1"/>
+          </p:cNvSpPr>
+          <p:nvPr>
+            <p:ph type="title"/>
+          </p:nvPr>
+        </p:nvSpPr>
+        <p:spPr/>
+        <p:txBody>
+          <a:bodyPr/>
+          <a:lstStyle/>
+          <a:p>
+            <a:r>
+              <a:rPr lang="da-DK" dirty="0"/>
+              <a:t>Design af brugerinterface</a:t>
+            </a:r>
+          </a:p>
+        </p:txBody>
+      </p:sp>
+      <p:sp>
+        <p:nvSpPr>
+          <p:cNvPr id="3" name="Pladsholder til indhold 2">
+            <a:extLst>
+              <a:ext uri="{FF2B5EF4-FFF2-40B4-BE49-F238E27FC236}">
+                <a16:creationId xmlns:a16="http://schemas.microsoft.com/office/drawing/2014/main" id="{C540E8C5-E10F-801D-E937-8C0A89F44006}"/>
+              </a:ext>
+            </a:extLst>
+          </p:cNvPr>
+          <p:cNvSpPr>
+            <a:spLocks noGrp="1"/>
+          </p:cNvSpPr>
+          <p:nvPr>
+            <p:ph idx="1"/>
+          </p:nvPr>
+        </p:nvSpPr>
+        <p:spPr/>
+        <p:txBody>
+          <a:bodyPr/>
+          <a:lstStyle/>
+          <a:p>
+            <a:r>
+              <a:rPr lang="da-DK" dirty="0"/>
+              <a:t>Meget simpelt.</a:t>
+            </a:r>
+          </a:p>
+          <a:p>
+            <a:r>
+              <a:rPr lang="da-DK" dirty="0"/>
+              <a:t>Rent design.</a:t>
+            </a:r>
+          </a:p>
+          <a:p>
+            <a:r>
+              <a:rPr lang="da-DK" dirty="0"/>
+              <a:t>Afspejle nørdet side.</a:t>
+            </a:r>
+          </a:p>
+        </p:txBody>
+      </p:sp>
+    </p:spTree>
+    <p:extLst>
+      <p:ext uri="{BB962C8B-B14F-4D97-AF65-F5344CB8AC3E}">
+        <p14:creationId xmlns:p14="http://schemas.microsoft.com/office/powerpoint/2010/main" val="3817496404"/>
+      </p:ext>
+    </p:extLst>
+  </p:cSld>
+  <p:clrMapOvr>
+    <a:masterClrMapping/>
+  </p:clrMapOvr>
+</p:sld>
+</file>
+
+<file path=ppt/slides/slide6.xml><?xml version="1.0" encoding="utf-8"?>
+<p:sld xmlns:a="http://schemas.openxmlformats.org/drawingml/2006/main" xmlns:r="http://schemas.openxmlformats.org/officeDocument/2006/relationships" xmlns:p="http://schemas.openxmlformats.org/presentationml/2006/main">
+  <p:cSld>
+    <p:spTree>
+      <p:nvGrpSpPr>
+        <p:cNvPr id="1" name=""/>
+        <p:cNvGrpSpPr/>
+        <p:nvPr/>
+      </p:nvGrpSpPr>
+      <p:grpSpPr>
+        <a:xfrm>
+          <a:off x="0" y="0"/>
+          <a:ext cx="0" cy="0"/>
+          <a:chOff x="0" y="0"/>
+          <a:chExt cx="0" cy="0"/>
+        </a:xfrm>
+      </p:grpSpPr>
+      <p:sp>
+        <p:nvSpPr>
+          <p:cNvPr id="2" name="Titel 1">
+            <a:extLst>
+              <a:ext uri="{FF2B5EF4-FFF2-40B4-BE49-F238E27FC236}">
+                <a16:creationId xmlns:a16="http://schemas.microsoft.com/office/drawing/2014/main" id="{E95178AF-5FAF-EEEA-980E-8B24FBB80148}"/>
+              </a:ext>
+            </a:extLst>
+          </p:cNvPr>
+          <p:cNvSpPr>
+            <a:spLocks noGrp="1"/>
+          </p:cNvSpPr>
+          <p:nvPr>
+            <p:ph type="title"/>
+          </p:nvPr>
+        </p:nvSpPr>
+        <p:spPr/>
+        <p:txBody>
+          <a:bodyPr/>
+          <a:lstStyle/>
+          <a:p>
+            <a:r>
+              <a:rPr lang="da-DK" dirty="0"/>
+              <a:t>Demo</a:t>
+            </a:r>
+          </a:p>
+        </p:txBody>
+      </p:sp>
+      <p:sp>
+        <p:nvSpPr>
+          <p:cNvPr id="3" name="Pladsholder til indhold 2">
+            <a:extLst>
+              <a:ext uri="{FF2B5EF4-FFF2-40B4-BE49-F238E27FC236}">
+                <a16:creationId xmlns:a16="http://schemas.microsoft.com/office/drawing/2014/main" id="{9D71C23D-EA26-9008-1120-552A2D68C938}"/>
+              </a:ext>
+            </a:extLst>
+          </p:cNvPr>
+          <p:cNvSpPr>
+            <a:spLocks noGrp="1"/>
+          </p:cNvSpPr>
+          <p:nvPr>
+            <p:ph idx="1"/>
+          </p:nvPr>
+        </p:nvSpPr>
+        <p:spPr/>
+        <p:txBody>
+          <a:bodyPr/>
+          <a:lstStyle/>
+          <a:p>
+            <a:endParaRPr lang="da-DK"/>
+          </a:p>
+        </p:txBody>
+      </p:sp>
+    </p:spTree>
+    <p:extLst>
+      <p:ext uri="{BB962C8B-B14F-4D97-AF65-F5344CB8AC3E}">
+        <p14:creationId xmlns:p14="http://schemas.microsoft.com/office/powerpoint/2010/main" val="1466590808"/>
+      </p:ext>
+    </p:extLst>
+  </p:cSld>
+  <p:clrMapOvr>
+    <a:masterClrMapping/>
+  </p:clrMapOvr>
+</p:sld>
+</file>
+
+<file path=ppt/slides/slide7.xml><?xml version="1.0" encoding="utf-8"?>
+<p:sld xmlns:a="http://schemas.openxmlformats.org/drawingml/2006/main" xmlns:r="http://schemas.openxmlformats.org/officeDocument/2006/relationships" xmlns:p="http://schemas.openxmlformats.org/presentationml/2006/main">
+  <p:cSld>
+    <p:spTree>
+      <p:nvGrpSpPr>
+        <p:cNvPr id="1" name=""/>
+        <p:cNvGrpSpPr/>
+        <p:nvPr/>
+      </p:nvGrpSpPr>
+      <p:grpSpPr>
+        <a:xfrm>
+          <a:off x="0" y="0"/>
+          <a:ext cx="0" cy="0"/>
+          <a:chOff x="0" y="0"/>
+          <a:chExt cx="0" cy="0"/>
+        </a:xfrm>
+      </p:grpSpPr>
+      <p:sp>
+        <p:nvSpPr>
+          <p:cNvPr id="2" name="Titel 1">
+            <a:extLst>
+              <a:ext uri="{FF2B5EF4-FFF2-40B4-BE49-F238E27FC236}">
+                <a16:creationId xmlns:a16="http://schemas.microsoft.com/office/drawing/2014/main" id="{FD8BD6DA-8C07-5339-96BE-453504F39519}"/>
+              </a:ext>
+            </a:extLst>
+          </p:cNvPr>
+          <p:cNvSpPr>
+            <a:spLocks noGrp="1"/>
+          </p:cNvSpPr>
+          <p:nvPr>
+            <p:ph type="title"/>
+          </p:nvPr>
+        </p:nvSpPr>
+        <p:spPr/>
+        <p:txBody>
+          <a:bodyPr/>
+          <a:lstStyle/>
+          <a:p>
+            <a:r>
+              <a:rPr lang="da-DK" dirty="0"/>
+              <a:t>Hvad der fungerer godt</a:t>
+            </a:r>
+          </a:p>
+        </p:txBody>
+      </p:sp>
+      <p:sp>
+        <p:nvSpPr>
+          <p:cNvPr id="3" name="Pladsholder til indhold 2">
+            <a:extLst>
+              <a:ext uri="{FF2B5EF4-FFF2-40B4-BE49-F238E27FC236}">
+                <a16:creationId xmlns:a16="http://schemas.microsoft.com/office/drawing/2014/main" id="{5061B897-5E6A-3170-BEDE-504150CD47D3}"/>
+              </a:ext>
+            </a:extLst>
+          </p:cNvPr>
+          <p:cNvSpPr>
+            <a:spLocks noGrp="1"/>
+          </p:cNvSpPr>
+          <p:nvPr>
+            <p:ph idx="1"/>
+          </p:nvPr>
+        </p:nvSpPr>
+        <p:spPr/>
+        <p:txBody>
+          <a:bodyPr/>
+          <a:lstStyle/>
+          <a:p>
+            <a:r>
+              <a:rPr lang="da-DK" dirty="0" err="1"/>
+              <a:t>Conditional</a:t>
+            </a:r>
+            <a:r>
+              <a:rPr lang="da-DK" dirty="0"/>
+              <a:t> </a:t>
+            </a:r>
+            <a:r>
+              <a:rPr lang="da-DK" dirty="0" err="1"/>
+              <a:t>rendering</a:t>
+            </a:r>
+            <a:endParaRPr lang="da-DK"/>
+          </a:p>
+          <a:p>
+            <a:endParaRPr lang="da-DK"/>
+          </a:p>
+        </p:txBody>
+      </p:sp>
+    </p:spTree>
+    <p:extLst>
+      <p:ext uri="{BB962C8B-B14F-4D97-AF65-F5344CB8AC3E}">
+        <p14:creationId xmlns:p14="http://schemas.microsoft.com/office/powerpoint/2010/main" val="3382590551"/>
       </p:ext>
     </p:extLst>
   </p:cSld>

</xml_diff>